<commit_message>
Modified documents and binary library
</commit_message>
<xml_diff>
--- a/doc/simple_side_drawer2.pptx
+++ b/doc/simple_side_drawer2.pptx
@@ -8280,8 +8280,8 @@
         </p:nvSpPr>
         <p:spPr>
           <a:xfrm>
-            <a:off x="2912537" y="2237264"/>
-            <a:ext cx="3327954" cy="369332"/>
+            <a:off x="2745669" y="2017130"/>
+            <a:ext cx="3661692" cy="646331"/>
           </a:xfrm>
           <a:prstGeom prst="rect">
             <a:avLst/>
@@ -8294,13 +8294,42 @@
           </a:bodyPr>
           <a:lstStyle/>
           <a:p>
-            <a:pPr algn="ctr"/>
             <a:r>
               <a:rPr lang="en-US" dirty="0" smtClean="0">
                 <a:latin typeface="Helvetica"/>
                 <a:cs typeface="Helvetica"/>
               </a:rPr>
-              <a:t>Side Drawer library for Android</a:t>
+              <a:t>What’s </a:t>
+            </a:r>
+            <a:r>
+              <a:rPr lang="en-US" dirty="0" err="1" smtClean="0">
+                <a:latin typeface="Helvetica"/>
+                <a:cs typeface="Helvetica"/>
+              </a:rPr>
+              <a:t>SimpleSideDrawer</a:t>
+            </a:r>
+            <a:r>
+              <a:rPr lang="en-US" dirty="0" smtClean="0">
+                <a:latin typeface="Helvetica"/>
+                <a:cs typeface="Helvetica"/>
+              </a:rPr>
+              <a:t>?</a:t>
+            </a:r>
+          </a:p>
+          <a:p>
+            <a:r>
+              <a:rPr lang="en-US" dirty="0" smtClean="0">
+                <a:latin typeface="Helvetica"/>
+                <a:cs typeface="Helvetica"/>
+              </a:rPr>
+              <a:t>&gt;&gt; Side </a:t>
+            </a:r>
+            <a:r>
+              <a:rPr lang="en-US" dirty="0" smtClean="0">
+                <a:latin typeface="Helvetica"/>
+                <a:cs typeface="Helvetica"/>
+              </a:rPr>
+              <a:t>Drawer library for Android</a:t>
             </a:r>
           </a:p>
         </p:txBody>
@@ -8313,7 +8342,7 @@
         </p:nvSpPr>
         <p:spPr>
           <a:xfrm>
-            <a:off x="3132671" y="2906131"/>
+            <a:off x="3132671" y="3312547"/>
             <a:ext cx="1442034" cy="1200329"/>
           </a:xfrm>
           <a:prstGeom prst="rect">
@@ -8376,7 +8405,7 @@
         </p:nvSpPr>
         <p:spPr>
           <a:xfrm>
-            <a:off x="4377215" y="2889197"/>
+            <a:off x="4377215" y="3295613"/>
             <a:ext cx="1715884" cy="1200329"/>
           </a:xfrm>
           <a:prstGeom prst="rect">
@@ -8465,6 +8494,42 @@
               <a:t>(Apache License, v2.0)</a:t>
             </a:r>
             <a:endParaRPr lang="en-US" dirty="0">
+              <a:latin typeface="Helvetica"/>
+              <a:cs typeface="Helvetica"/>
+            </a:endParaRPr>
+          </a:p>
+        </p:txBody>
+      </p:sp>
+      <p:sp>
+        <p:nvSpPr>
+          <p:cNvPr id="6" name="TextBox 5"/>
+          <p:cNvSpPr txBox="1"/>
+          <p:nvPr/>
+        </p:nvSpPr>
+        <p:spPr>
+          <a:xfrm>
+            <a:off x="2745669" y="2930865"/>
+            <a:ext cx="1159730" cy="369332"/>
+          </a:xfrm>
+          <a:prstGeom prst="rect">
+            <a:avLst/>
+          </a:prstGeom>
+          <a:noFill/>
+        </p:spPr>
+        <p:txBody>
+          <a:bodyPr wrap="none" rtlCol="0">
+            <a:spAutoFit/>
+          </a:bodyPr>
+          <a:lstStyle/>
+          <a:p>
+            <a:r>
+              <a:rPr lang="en-US" dirty="0" smtClean="0">
+                <a:latin typeface="Helvetica"/>
+                <a:cs typeface="Helvetica"/>
+              </a:rPr>
+              <a:t>Features:</a:t>
+            </a:r>
+            <a:endParaRPr lang="en-US" dirty="0" smtClean="0">
               <a:latin typeface="Helvetica"/>
               <a:cs typeface="Helvetica"/>
             </a:endParaRPr>

</xml_diff>

<commit_message>
Removed comments in the src
</commit_message>
<xml_diff>
--- a/doc/simple_side_drawer2.pptx
+++ b/doc/simple_side_drawer2.pptx
@@ -8536,6 +8536,87 @@
           </a:p>
         </p:txBody>
       </p:sp>
+      <p:sp>
+        <p:nvSpPr>
+          <p:cNvPr id="4" name="Rectangle 3"/>
+          <p:cNvSpPr/>
+          <p:nvPr/>
+        </p:nvSpPr>
+        <p:spPr>
+          <a:xfrm>
+            <a:off x="4013200" y="4984860"/>
+            <a:ext cx="4572000" cy="261610"/>
+          </a:xfrm>
+          <a:prstGeom prst="rect">
+            <a:avLst/>
+          </a:prstGeom>
+        </p:spPr>
+        <p:txBody>
+          <a:bodyPr>
+            <a:spAutoFit/>
+          </a:bodyPr>
+          <a:lstStyle/>
+          <a:p>
+            <a:r>
+              <a:rPr lang="en-US" sz="1100" dirty="0">
+                <a:latin typeface="Helvetica"/>
+                <a:cs typeface="Helvetica"/>
+              </a:rPr>
+              <a:t>https://</a:t>
+            </a:r>
+            <a:r>
+              <a:rPr lang="en-US" sz="1100" dirty="0" err="1">
+                <a:latin typeface="Helvetica"/>
+                <a:cs typeface="Helvetica"/>
+              </a:rPr>
+              <a:t>github.com</a:t>
+            </a:r>
+            <a:r>
+              <a:rPr lang="en-US" sz="1100" dirty="0">
+                <a:latin typeface="Helvetica"/>
+                <a:cs typeface="Helvetica"/>
+              </a:rPr>
+              <a:t>/adamrocker/simple-side-drawer</a:t>
+            </a:r>
+          </a:p>
+        </p:txBody>
+      </p:sp>
+      <p:cxnSp>
+        <p:nvCxnSpPr>
+          <p:cNvPr id="8" name="Straight Connector 7"/>
+          <p:cNvCxnSpPr/>
+          <p:nvPr/>
+        </p:nvCxnSpPr>
+        <p:spPr>
+          <a:xfrm>
+            <a:off x="3581400" y="4495942"/>
+            <a:ext cx="499533" cy="567125"/>
+          </a:xfrm>
+          <a:prstGeom prst="line">
+            <a:avLst/>
+          </a:prstGeom>
+          <a:ln w="12700" cmpd="sng">
+            <a:solidFill>
+              <a:schemeClr val="tx1"/>
+            </a:solidFill>
+          </a:ln>
+          <a:effectLst/>
+        </p:spPr>
+        <p:style>
+          <a:lnRef idx="2">
+            <a:schemeClr val="accent1"/>
+          </a:lnRef>
+          <a:fillRef idx="0">
+            <a:schemeClr val="accent1"/>
+          </a:fillRef>
+          <a:effectRef idx="1">
+            <a:schemeClr val="accent1"/>
+          </a:effectRef>
+          <a:fontRef idx="minor">
+            <a:schemeClr val="tx1"/>
+          </a:fontRef>
+        </p:style>
+      </p:cxnSp>
     </p:spTree>
     <p:extLst>
       <p:ext uri="{BB962C8B-B14F-4D97-AF65-F5344CB8AC3E}">

</xml_diff>

<commit_message>
Change the default animation interpolator
</commit_message>
<xml_diff>
--- a/doc/simple_side_drawer2.pptx
+++ b/doc/simple_side_drawer2.pptx
@@ -304,7 +304,7 @@
           <a:p>
             <a:fld id="{C9B8891A-DAAD-CF4D-8A59-349CF45E05F6}" type="datetimeFigureOut">
               <a:rPr lang="en-US" smtClean="0"/>
-              <a:t>2013/03/21</a:t>
+              <a:t>2013/03/27</a:t>
             </a:fld>
             <a:endParaRPr lang="en-US"/>
           </a:p>
@@ -474,7 +474,7 @@
           <a:p>
             <a:fld id="{C9B8891A-DAAD-CF4D-8A59-349CF45E05F6}" type="datetimeFigureOut">
               <a:rPr lang="en-US" smtClean="0"/>
-              <a:t>2013/03/21</a:t>
+              <a:t>2013/03/27</a:t>
             </a:fld>
             <a:endParaRPr lang="en-US"/>
           </a:p>
@@ -654,7 +654,7 @@
           <a:p>
             <a:fld id="{C9B8891A-DAAD-CF4D-8A59-349CF45E05F6}" type="datetimeFigureOut">
               <a:rPr lang="en-US" smtClean="0"/>
-              <a:t>2013/03/21</a:t>
+              <a:t>2013/03/27</a:t>
             </a:fld>
             <a:endParaRPr lang="en-US"/>
           </a:p>
@@ -824,7 +824,7 @@
           <a:p>
             <a:fld id="{C9B8891A-DAAD-CF4D-8A59-349CF45E05F6}" type="datetimeFigureOut">
               <a:rPr lang="en-US" smtClean="0"/>
-              <a:t>2013/03/21</a:t>
+              <a:t>2013/03/27</a:t>
             </a:fld>
             <a:endParaRPr lang="en-US"/>
           </a:p>
@@ -1070,7 +1070,7 @@
           <a:p>
             <a:fld id="{C9B8891A-DAAD-CF4D-8A59-349CF45E05F6}" type="datetimeFigureOut">
               <a:rPr lang="en-US" smtClean="0"/>
-              <a:t>2013/03/21</a:t>
+              <a:t>2013/03/27</a:t>
             </a:fld>
             <a:endParaRPr lang="en-US"/>
           </a:p>
@@ -1358,7 +1358,7 @@
           <a:p>
             <a:fld id="{C9B8891A-DAAD-CF4D-8A59-349CF45E05F6}" type="datetimeFigureOut">
               <a:rPr lang="en-US" smtClean="0"/>
-              <a:t>2013/03/21</a:t>
+              <a:t>2013/03/27</a:t>
             </a:fld>
             <a:endParaRPr lang="en-US"/>
           </a:p>
@@ -1780,7 +1780,7 @@
           <a:p>
             <a:fld id="{C9B8891A-DAAD-CF4D-8A59-349CF45E05F6}" type="datetimeFigureOut">
               <a:rPr lang="en-US" smtClean="0"/>
-              <a:t>2013/03/21</a:t>
+              <a:t>2013/03/27</a:t>
             </a:fld>
             <a:endParaRPr lang="en-US"/>
           </a:p>
@@ -1898,7 +1898,7 @@
           <a:p>
             <a:fld id="{C9B8891A-DAAD-CF4D-8A59-349CF45E05F6}" type="datetimeFigureOut">
               <a:rPr lang="en-US" smtClean="0"/>
-              <a:t>2013/03/21</a:t>
+              <a:t>2013/03/27</a:t>
             </a:fld>
             <a:endParaRPr lang="en-US"/>
           </a:p>
@@ -1993,7 +1993,7 @@
           <a:p>
             <a:fld id="{C9B8891A-DAAD-CF4D-8A59-349CF45E05F6}" type="datetimeFigureOut">
               <a:rPr lang="en-US" smtClean="0"/>
-              <a:t>2013/03/21</a:t>
+              <a:t>2013/03/27</a:t>
             </a:fld>
             <a:endParaRPr lang="en-US"/>
           </a:p>
@@ -2270,7 +2270,7 @@
           <a:p>
             <a:fld id="{C9B8891A-DAAD-CF4D-8A59-349CF45E05F6}" type="datetimeFigureOut">
               <a:rPr lang="en-US" smtClean="0"/>
-              <a:t>2013/03/21</a:t>
+              <a:t>2013/03/27</a:t>
             </a:fld>
             <a:endParaRPr lang="en-US"/>
           </a:p>
@@ -2523,7 +2523,7 @@
           <a:p>
             <a:fld id="{C9B8891A-DAAD-CF4D-8A59-349CF45E05F6}" type="datetimeFigureOut">
               <a:rPr lang="en-US" smtClean="0"/>
-              <a:t>2013/03/21</a:t>
+              <a:t>2013/03/27</a:t>
             </a:fld>
             <a:endParaRPr lang="en-US"/>
           </a:p>
@@ -2736,7 +2736,7 @@
           <a:p>
             <a:fld id="{C9B8891A-DAAD-CF4D-8A59-349CF45E05F6}" type="datetimeFigureOut">
               <a:rPr lang="en-US" smtClean="0"/>
-              <a:t>2013/03/21</a:t>
+              <a:t>2013/03/27</a:t>
             </a:fld>
             <a:endParaRPr lang="en-US"/>
           </a:p>
@@ -3432,21 +3432,7 @@
                 <a:latin typeface="Helvetica"/>
                 <a:cs typeface="Helvetica"/>
               </a:rPr>
-              <a:t>◆ </a:t>
-            </a:r>
-            <a:r>
-              <a:rPr lang="en-US" altLang="ja-JP" dirty="0" smtClean="0">
-                <a:latin typeface="Helvetica"/>
-                <a:cs typeface="Helvetica"/>
-              </a:rPr>
-              <a:t>Android’s </a:t>
-            </a:r>
-            <a:r>
-              <a:rPr lang="en-US" altLang="ja-JP" dirty="0" smtClean="0">
-                <a:latin typeface="Helvetica"/>
-                <a:cs typeface="Helvetica"/>
-              </a:rPr>
-              <a:t>layout system</a:t>
+              <a:t>◆ Android’s layout system</a:t>
             </a:r>
             <a:endParaRPr lang="en-US" dirty="0">
               <a:latin typeface="Helvetica"/>
@@ -3812,14 +3798,7 @@
                 <a:latin typeface="Helvetica"/>
                 <a:cs typeface="Helvetica"/>
               </a:rPr>
-              <a:t>◆ Remove the above layout </a:t>
-            </a:r>
-            <a:r>
-              <a:rPr lang="en-US" altLang="ja-JP" dirty="0" smtClean="0">
-                <a:latin typeface="Helvetica"/>
-                <a:cs typeface="Helvetica"/>
-              </a:rPr>
-              <a:t>view from the decor</a:t>
+              <a:t>◆ Remove the above layout view from the decor</a:t>
             </a:r>
             <a:endParaRPr lang="en-US" dirty="0">
               <a:latin typeface="Helvetica"/>
@@ -4825,7 +4804,17 @@
                 <a:latin typeface="Helvetica"/>
                 <a:cs typeface="Helvetica"/>
               </a:rPr>
-              <a:t>eight=0</a:t>
+              <a:t>eight</a:t>
+            </a:r>
+            <a:r>
+              <a:rPr lang="en-US" dirty="0" smtClean="0">
+                <a:solidFill>
+                  <a:schemeClr val="bg1"/>
+                </a:solidFill>
+                <a:latin typeface="Helvetica"/>
+                <a:cs typeface="Helvetica"/>
+              </a:rPr>
+              <a:t>=1</a:t>
             </a:r>
             <a:endParaRPr lang="en-US" dirty="0">
               <a:solidFill>
@@ -5788,7 +5777,17 @@
                 <a:latin typeface="Helvetica"/>
                 <a:cs typeface="Helvetica"/>
               </a:rPr>
-              <a:t>eight=0</a:t>
+              <a:t>eight</a:t>
+            </a:r>
+            <a:r>
+              <a:rPr lang="en-US" dirty="0" smtClean="0">
+                <a:solidFill>
+                  <a:schemeClr val="bg1"/>
+                </a:solidFill>
+                <a:latin typeface="Helvetica"/>
+                <a:cs typeface="Helvetica"/>
+              </a:rPr>
+              <a:t>=1</a:t>
             </a:r>
             <a:endParaRPr lang="en-US" dirty="0">
               <a:solidFill>
@@ -6655,7 +6654,17 @@
                 <a:latin typeface="Helvetica"/>
                 <a:cs typeface="Helvetica"/>
               </a:rPr>
-              <a:t>eight=0</a:t>
+              <a:t>eight</a:t>
+            </a:r>
+            <a:r>
+              <a:rPr lang="en-US" dirty="0" smtClean="0">
+                <a:solidFill>
+                  <a:schemeClr val="bg1"/>
+                </a:solidFill>
+                <a:latin typeface="Helvetica"/>
+                <a:cs typeface="Helvetica"/>
+              </a:rPr>
+              <a:t>=1</a:t>
             </a:r>
             <a:endParaRPr lang="en-US" dirty="0">
               <a:solidFill>
@@ -7354,109 +7363,52 @@
           </a:p>
         </p:txBody>
       </p:sp>
-      <p:grpSp>
-        <p:nvGrpSpPr>
-          <p:cNvPr id="51" name="Group 50"/>
-          <p:cNvGrpSpPr/>
-          <p:nvPr/>
-        </p:nvGrpSpPr>
-        <p:grpSpPr>
-          <a:xfrm>
-            <a:off x="4458607" y="2991566"/>
-            <a:ext cx="1695518" cy="3556415"/>
-            <a:chOff x="3451117" y="2102531"/>
-            <a:chExt cx="1695518" cy="3556415"/>
-          </a:xfrm>
-        </p:grpSpPr>
-        <p:sp>
-          <p:nvSpPr>
-            <p:cNvPr id="52" name="Parallelogram 51"/>
-            <p:cNvSpPr/>
-            <p:nvPr/>
-          </p:nvSpPr>
-          <p:spPr>
-            <a:xfrm rot="5400000" flipV="1">
-              <a:off x="2520668" y="3032980"/>
-              <a:ext cx="3556415" cy="1695518"/>
-            </a:xfrm>
-            <a:prstGeom prst="parallelogram">
-              <a:avLst/>
-            </a:prstGeom>
+      <p:sp>
+        <p:nvSpPr>
+          <p:cNvPr id="52" name="Parallelogram 51"/>
+          <p:cNvSpPr/>
+          <p:nvPr/>
+        </p:nvSpPr>
+        <p:spPr>
+          <a:xfrm rot="5400000" flipV="1">
+            <a:off x="3528158" y="3922015"/>
+            <a:ext cx="3556415" cy="1695518"/>
+          </a:xfrm>
+          <a:prstGeom prst="parallelogram">
+            <a:avLst/>
+          </a:prstGeom>
+          <a:solidFill>
+            <a:schemeClr val="accent1"/>
+          </a:solidFill>
+          <a:ln w="76200" cmpd="sng">
             <a:solidFill>
-              <a:schemeClr val="accent1"/>
+              <a:schemeClr val="tx2"/>
             </a:solidFill>
-            <a:ln w="76200" cmpd="sng">
-              <a:solidFill>
-                <a:schemeClr val="tx2"/>
-              </a:solidFill>
-            </a:ln>
-          </p:spPr>
-          <p:style>
-            <a:lnRef idx="1">
-              <a:schemeClr val="accent1"/>
-            </a:lnRef>
-            <a:fillRef idx="3">
-              <a:schemeClr val="accent1"/>
-            </a:fillRef>
-            <a:effectRef idx="2">
-              <a:schemeClr val="accent1"/>
-            </a:effectRef>
-            <a:fontRef idx="minor">
-              <a:schemeClr val="lt1"/>
-            </a:fontRef>
-          </p:style>
-          <p:txBody>
-            <a:bodyPr rtlCol="0" anchor="ctr"/>
-            <a:lstStyle/>
-            <a:p>
-              <a:pPr algn="ctr"/>
-              <a:endParaRPr lang="en-US"/>
-            </a:p>
-          </p:txBody>
-        </p:sp>
-        <p:sp>
-          <p:nvSpPr>
-            <p:cNvPr id="53" name="TextBox 52"/>
-            <p:cNvSpPr txBox="1"/>
-            <p:nvPr/>
-          </p:nvSpPr>
-          <p:spPr>
-            <a:xfrm>
-              <a:off x="3910950" y="3649153"/>
-              <a:ext cx="839180" cy="369332"/>
-            </a:xfrm>
-            <a:prstGeom prst="rect">
-              <a:avLst/>
-            </a:prstGeom>
-            <a:noFill/>
-          </p:spPr>
-          <p:txBody>
-            <a:bodyPr wrap="none" rtlCol="0">
-              <a:spAutoFit/>
-            </a:bodyPr>
-            <a:lstStyle/>
-            <a:p>
-              <a:r>
-                <a:rPr lang="en-US" dirty="0" smtClean="0">
-                  <a:solidFill>
-                    <a:schemeClr val="bg1"/>
-                  </a:solidFill>
-                  <a:latin typeface="Helvetica"/>
-                  <a:cs typeface="Helvetica"/>
-                </a:rPr>
-                <a:t>Above</a:t>
-              </a:r>
-              <a:endParaRPr lang="en-US" dirty="0">
-                <a:solidFill>
-                  <a:schemeClr val="bg1"/>
-                </a:solidFill>
-                <a:latin typeface="Helvetica"/>
-                <a:cs typeface="Helvetica"/>
-              </a:endParaRPr>
-            </a:p>
-          </p:txBody>
-        </p:sp>
-      </p:grpSp>
+          </a:ln>
+        </p:spPr>
+        <p:style>
+          <a:lnRef idx="1">
+            <a:schemeClr val="accent1"/>
+          </a:lnRef>
+          <a:fillRef idx="3">
+            <a:schemeClr val="accent1"/>
+          </a:fillRef>
+          <a:effectRef idx="2">
+            <a:schemeClr val="accent1"/>
+          </a:effectRef>
+          <a:fontRef idx="minor">
+            <a:schemeClr val="lt1"/>
+          </a:fontRef>
+        </p:style>
+        <p:txBody>
+          <a:bodyPr rtlCol="0" anchor="ctr"/>
+          <a:lstStyle/>
+          <a:p>
+            <a:pPr algn="ctr"/>
+            <a:endParaRPr lang="en-US"/>
+          </a:p>
+        </p:txBody>
+      </p:sp>
       <p:grpSp>
         <p:nvGrpSpPr>
           <p:cNvPr id="30" name="Group 29"/>
@@ -8322,14 +8274,7 @@
                 <a:latin typeface="Helvetica"/>
                 <a:cs typeface="Helvetica"/>
               </a:rPr>
-              <a:t>&gt;&gt; Side </a:t>
-            </a:r>
-            <a:r>
-              <a:rPr lang="en-US" dirty="0" smtClean="0">
-                <a:latin typeface="Helvetica"/>
-                <a:cs typeface="Helvetica"/>
-              </a:rPr>
-              <a:t>Drawer library for Android</a:t>
+              <a:t>&gt;&gt; Side Drawer library for Android</a:t>
             </a:r>
           </a:p>
         </p:txBody>
@@ -8529,10 +8474,6 @@
               </a:rPr>
               <a:t>Features:</a:t>
             </a:r>
-            <a:endParaRPr lang="en-US" dirty="0" smtClean="0">
-              <a:latin typeface="Helvetica"/>
-              <a:cs typeface="Helvetica"/>
-            </a:endParaRPr>
           </a:p>
         </p:txBody>
       </p:sp>

</xml_diff>